<commit_message>
added a meme to slides
</commit_message>
<xml_diff>
--- a/Slides.pptx
+++ b/Slides.pptx
@@ -5,40 +5,41 @@
     <p:sldMasterId id="2147483660" r:id="rId1"/>
   </p:sldMasterIdLst>
   <p:notesMasterIdLst>
-    <p:notesMasterId r:id="rId33"/>
+    <p:notesMasterId r:id="rId34"/>
   </p:notesMasterIdLst>
   <p:sldIdLst>
     <p:sldId id="256" r:id="rId2"/>
     <p:sldId id="257" r:id="rId3"/>
     <p:sldId id="294" r:id="rId4"/>
     <p:sldId id="259" r:id="rId5"/>
-    <p:sldId id="263" r:id="rId6"/>
-    <p:sldId id="293" r:id="rId7"/>
-    <p:sldId id="291" r:id="rId8"/>
-    <p:sldId id="258" r:id="rId9"/>
-    <p:sldId id="292" r:id="rId10"/>
-    <p:sldId id="265" r:id="rId11"/>
-    <p:sldId id="283" r:id="rId12"/>
-    <p:sldId id="262" r:id="rId13"/>
-    <p:sldId id="267" r:id="rId14"/>
-    <p:sldId id="269" r:id="rId15"/>
-    <p:sldId id="282" r:id="rId16"/>
-    <p:sldId id="272" r:id="rId17"/>
-    <p:sldId id="296" r:id="rId18"/>
-    <p:sldId id="270" r:id="rId19"/>
-    <p:sldId id="295" r:id="rId20"/>
-    <p:sldId id="274" r:id="rId21"/>
-    <p:sldId id="276" r:id="rId22"/>
-    <p:sldId id="275" r:id="rId23"/>
-    <p:sldId id="278" r:id="rId24"/>
-    <p:sldId id="279" r:id="rId25"/>
-    <p:sldId id="289" r:id="rId26"/>
-    <p:sldId id="281" r:id="rId27"/>
-    <p:sldId id="285" r:id="rId28"/>
-    <p:sldId id="297" r:id="rId29"/>
-    <p:sldId id="288" r:id="rId30"/>
-    <p:sldId id="260" r:id="rId31"/>
-    <p:sldId id="290" r:id="rId32"/>
+    <p:sldId id="298" r:id="rId6"/>
+    <p:sldId id="263" r:id="rId7"/>
+    <p:sldId id="293" r:id="rId8"/>
+    <p:sldId id="291" r:id="rId9"/>
+    <p:sldId id="258" r:id="rId10"/>
+    <p:sldId id="292" r:id="rId11"/>
+    <p:sldId id="265" r:id="rId12"/>
+    <p:sldId id="283" r:id="rId13"/>
+    <p:sldId id="262" r:id="rId14"/>
+    <p:sldId id="267" r:id="rId15"/>
+    <p:sldId id="269" r:id="rId16"/>
+    <p:sldId id="282" r:id="rId17"/>
+    <p:sldId id="272" r:id="rId18"/>
+    <p:sldId id="296" r:id="rId19"/>
+    <p:sldId id="270" r:id="rId20"/>
+    <p:sldId id="295" r:id="rId21"/>
+    <p:sldId id="274" r:id="rId22"/>
+    <p:sldId id="276" r:id="rId23"/>
+    <p:sldId id="275" r:id="rId24"/>
+    <p:sldId id="278" r:id="rId25"/>
+    <p:sldId id="279" r:id="rId26"/>
+    <p:sldId id="289" r:id="rId27"/>
+    <p:sldId id="281" r:id="rId28"/>
+    <p:sldId id="285" r:id="rId29"/>
+    <p:sldId id="297" r:id="rId30"/>
+    <p:sldId id="288" r:id="rId31"/>
+    <p:sldId id="260" r:id="rId32"/>
+    <p:sldId id="290" r:id="rId33"/>
   </p:sldIdLst>
   <p:sldSz cx="12192000" cy="6858000"/>
   <p:notesSz cx="6858000" cy="9144000"/>
@@ -654,7 +655,7 @@
           <a:p>
             <a:fld id="{E7396038-7FD2-034F-85C6-986CD04FB57A}" type="slidenum">
               <a:rPr lang="en-US" smtClean="0"/>
-              <a:t>16</a:t>
+              <a:t>17</a:t>
             </a:fld>
             <a:endParaRPr lang="en-US"/>
           </a:p>
@@ -738,7 +739,7 @@
           <a:p>
             <a:fld id="{E7396038-7FD2-034F-85C6-986CD04FB57A}" type="slidenum">
               <a:rPr lang="en-US" smtClean="0"/>
-              <a:t>20</a:t>
+              <a:t>21</a:t>
             </a:fld>
             <a:endParaRPr lang="en-US"/>
           </a:p>
@@ -4476,6 +4477,205 @@
 <file path=ppt/slides/slide10.xml><?xml version="1.0" encoding="utf-8"?>
 <p:sld xmlns:a="http://schemas.openxmlformats.org/drawingml/2006/main" xmlns:r="http://schemas.openxmlformats.org/officeDocument/2006/relationships" xmlns:p="http://schemas.openxmlformats.org/presentationml/2006/main">
   <p:cSld>
+    <p:spTree>
+      <p:nvGrpSpPr>
+        <p:cNvPr id="1" name=""/>
+        <p:cNvGrpSpPr/>
+        <p:nvPr/>
+      </p:nvGrpSpPr>
+      <p:grpSpPr>
+        <a:xfrm>
+          <a:off x="0" y="0"/>
+          <a:ext cx="0" cy="0"/>
+          <a:chOff x="0" y="0"/>
+          <a:chExt cx="0" cy="0"/>
+        </a:xfrm>
+      </p:grpSpPr>
+      <p:sp>
+        <p:nvSpPr>
+          <p:cNvPr id="2" name="Title 1">
+            <a:extLst>
+              <a:ext uri="{FF2B5EF4-FFF2-40B4-BE49-F238E27FC236}">
+                <a16:creationId xmlns:a16="http://schemas.microsoft.com/office/drawing/2014/main" id="{5310DE1A-4192-5553-29B5-6BA6656017A3}"/>
+              </a:ext>
+            </a:extLst>
+          </p:cNvPr>
+          <p:cNvSpPr>
+            <a:spLocks noGrp="1"/>
+          </p:cNvSpPr>
+          <p:nvPr>
+            <p:ph type="title"/>
+          </p:nvPr>
+        </p:nvSpPr>
+        <p:spPr/>
+        <p:txBody>
+          <a:bodyPr/>
+          <a:lstStyle/>
+          <a:p>
+            <a:r>
+              <a:rPr lang="en-US" dirty="0"/>
+              <a:t>Massachusetts Department of Public Health (MDPH)</a:t>
+            </a:r>
+          </a:p>
+        </p:txBody>
+      </p:sp>
+      <p:sp>
+        <p:nvSpPr>
+          <p:cNvPr id="3" name="Content Placeholder 2">
+            <a:extLst>
+              <a:ext uri="{FF2B5EF4-FFF2-40B4-BE49-F238E27FC236}">
+                <a16:creationId xmlns:a16="http://schemas.microsoft.com/office/drawing/2014/main" id="{5EC2C4E6-C8FD-D740-3ACD-1622C342669E}"/>
+              </a:ext>
+            </a:extLst>
+          </p:cNvPr>
+          <p:cNvSpPr>
+            <a:spLocks noGrp="1"/>
+          </p:cNvSpPr>
+          <p:nvPr>
+            <p:ph idx="1"/>
+          </p:nvPr>
+        </p:nvSpPr>
+        <p:spPr/>
+        <p:txBody>
+          <a:bodyPr>
+            <a:normAutofit fontScale="92500" lnSpcReduction="10000"/>
+          </a:bodyPr>
+          <a:lstStyle/>
+          <a:p>
+            <a:r>
+              <a:rPr lang="en-US" dirty="0"/>
+              <a:t>Goals</a:t>
+            </a:r>
+          </a:p>
+          <a:p>
+            <a:pPr marL="971550" lvl="1" indent="-514350">
+              <a:buFont typeface="+mj-lt"/>
+              <a:buAutoNum type="arabicPeriod"/>
+            </a:pPr>
+            <a:r>
+              <a:rPr lang="en-US" dirty="0"/>
+              <a:t>Identify actionable Policy Insights for MDPH</a:t>
+            </a:r>
+          </a:p>
+          <a:p>
+            <a:pPr marL="971550" lvl="1" indent="-514350">
+              <a:buFont typeface="+mj-lt"/>
+              <a:buAutoNum type="arabicPeriod"/>
+            </a:pPr>
+            <a:r>
+              <a:rPr lang="en-US" dirty="0"/>
+              <a:t>Empower insurers to structure premiums based on evidence rather than assumptions</a:t>
+            </a:r>
+          </a:p>
+          <a:p>
+            <a:r>
+              <a:rPr lang="en-US" dirty="0"/>
+              <a:t>Variables</a:t>
+            </a:r>
+          </a:p>
+          <a:p>
+            <a:pPr marL="971550" lvl="1" indent="-514350">
+              <a:buFont typeface="+mj-lt"/>
+              <a:buAutoNum type="arabicPeriod"/>
+            </a:pPr>
+            <a:r>
+              <a:rPr lang="en-US" dirty="0"/>
+              <a:t>Sex, Smoking Habits, Region </a:t>
+            </a:r>
+          </a:p>
+          <a:p>
+            <a:pPr marL="971550" lvl="1" indent="-514350">
+              <a:buFont typeface="+mj-lt"/>
+              <a:buAutoNum type="arabicPeriod"/>
+            </a:pPr>
+            <a:r>
+              <a:rPr lang="en-US" dirty="0"/>
+              <a:t>Age, BMI, Dependents</a:t>
+            </a:r>
+          </a:p>
+          <a:p>
+            <a:pPr marL="971550" lvl="1" indent="-514350">
+              <a:buFont typeface="+mj-lt"/>
+              <a:buAutoNum type="arabicPeriod"/>
+            </a:pPr>
+            <a:r>
+              <a:rPr lang="en-US" dirty="0"/>
+              <a:t>Insurance Charges</a:t>
+            </a:r>
+          </a:p>
+        </p:txBody>
+      </p:sp>
+      <p:sp>
+        <p:nvSpPr>
+          <p:cNvPr id="4" name="Text Placeholder 3">
+            <a:extLst>
+              <a:ext uri="{FF2B5EF4-FFF2-40B4-BE49-F238E27FC236}">
+                <a16:creationId xmlns:a16="http://schemas.microsoft.com/office/drawing/2014/main" id="{434C140E-6C65-A811-E965-00A3ABEE9232}"/>
+              </a:ext>
+            </a:extLst>
+          </p:cNvPr>
+          <p:cNvSpPr>
+            <a:spLocks noGrp="1"/>
+          </p:cNvSpPr>
+          <p:nvPr>
+            <p:ph type="body" sz="half" idx="2"/>
+          </p:nvPr>
+        </p:nvSpPr>
+        <p:spPr/>
+        <p:txBody>
+          <a:bodyPr/>
+          <a:lstStyle/>
+          <a:p>
+            <a:r>
+              <a:rPr lang="en-US" dirty="0"/>
+              <a:t>Identifying key factors driving health insurance charges.</a:t>
+            </a:r>
+          </a:p>
+          <a:p>
+            <a:endParaRPr lang="en-US" dirty="0"/>
+          </a:p>
+          <a:p>
+            <a:endParaRPr lang="en-US" b="1" dirty="0"/>
+          </a:p>
+          <a:p>
+            <a:endParaRPr lang="en-US" b="1" dirty="0"/>
+          </a:p>
+          <a:p>
+            <a:endParaRPr lang="en-US" b="1" dirty="0"/>
+          </a:p>
+          <a:p>
+            <a:endParaRPr lang="en-US" b="1" dirty="0"/>
+          </a:p>
+          <a:p>
+            <a:endParaRPr lang="en-US" b="1" dirty="0"/>
+          </a:p>
+          <a:p>
+            <a:endParaRPr lang="en-US" b="1" dirty="0"/>
+          </a:p>
+          <a:p>
+            <a:r>
+              <a:rPr lang="en-US" b="1" dirty="0"/>
+              <a:t>NOTE: Fictional Case Study</a:t>
+            </a:r>
+          </a:p>
+        </p:txBody>
+      </p:sp>
+    </p:spTree>
+    <p:extLst>
+      <p:ext uri="{BB962C8B-B14F-4D97-AF65-F5344CB8AC3E}">
+        <p14:creationId xmlns:p14="http://schemas.microsoft.com/office/powerpoint/2010/main" val="2681427100"/>
+      </p:ext>
+    </p:extLst>
+  </p:cSld>
+  <p:clrMapOvr>
+    <a:masterClrMapping/>
+  </p:clrMapOvr>
+</p:sld>
+</file>
+
+<file path=ppt/slides/slide11.xml><?xml version="1.0" encoding="utf-8"?>
+<p:sld xmlns:a="http://schemas.openxmlformats.org/drawingml/2006/main" xmlns:r="http://schemas.openxmlformats.org/officeDocument/2006/relationships" xmlns:p="http://schemas.openxmlformats.org/presentationml/2006/main">
+  <p:cSld>
     <p:bg>
       <p:bgPr>
         <a:solidFill>
@@ -5026,7 +5226,7 @@
 </p:sld>
 </file>
 
-<file path=ppt/slides/slide11.xml><?xml version="1.0" encoding="utf-8"?>
+<file path=ppt/slides/slide12.xml><?xml version="1.0" encoding="utf-8"?>
 <p:sld xmlns:a="http://schemas.openxmlformats.org/drawingml/2006/main" xmlns:r="http://schemas.openxmlformats.org/officeDocument/2006/relationships" xmlns:p="http://schemas.openxmlformats.org/presentationml/2006/main">
   <p:cSld>
     <p:spTree>
@@ -5117,7 +5317,7 @@
 </p:sld>
 </file>
 
-<file path=ppt/slides/slide12.xml><?xml version="1.0" encoding="utf-8"?>
+<file path=ppt/slides/slide13.xml><?xml version="1.0" encoding="utf-8"?>
 <p:sld xmlns:a="http://schemas.openxmlformats.org/drawingml/2006/main" xmlns:r="http://schemas.openxmlformats.org/officeDocument/2006/relationships" xmlns:p="http://schemas.openxmlformats.org/presentationml/2006/main">
   <p:cSld>
     <p:spTree>
@@ -5946,7 +6146,7 @@
 </p:sld>
 </file>
 
-<file path=ppt/slides/slide13.xml><?xml version="1.0" encoding="utf-8"?>
+<file path=ppt/slides/slide14.xml><?xml version="1.0" encoding="utf-8"?>
 <p:sld xmlns:a="http://schemas.openxmlformats.org/drawingml/2006/main" xmlns:r="http://schemas.openxmlformats.org/officeDocument/2006/relationships" xmlns:p="http://schemas.openxmlformats.org/presentationml/2006/main">
   <p:cSld>
     <p:spTree>
@@ -7155,7 +7355,7 @@
 </p:sld>
 </file>
 
-<file path=ppt/slides/slide14.xml><?xml version="1.0" encoding="utf-8"?>
+<file path=ppt/slides/slide15.xml><?xml version="1.0" encoding="utf-8"?>
 <p:sld xmlns:a="http://schemas.openxmlformats.org/drawingml/2006/main" xmlns:r="http://schemas.openxmlformats.org/officeDocument/2006/relationships" xmlns:p="http://schemas.openxmlformats.org/presentationml/2006/main">
   <p:cSld>
     <p:spTree>
@@ -7864,7 +8064,7 @@
 </p:sld>
 </file>
 
-<file path=ppt/slides/slide15.xml><?xml version="1.0" encoding="utf-8"?>
+<file path=ppt/slides/slide16.xml><?xml version="1.0" encoding="utf-8"?>
 <p:sld xmlns:a="http://schemas.openxmlformats.org/drawingml/2006/main" xmlns:r="http://schemas.openxmlformats.org/officeDocument/2006/relationships" xmlns:p="http://schemas.openxmlformats.org/presentationml/2006/main">
   <p:cSld>
     <p:spTree>
@@ -7950,7 +8150,7 @@
 </p:sld>
 </file>
 
-<file path=ppt/slides/slide16.xml><?xml version="1.0" encoding="utf-8"?>
+<file path=ppt/slides/slide17.xml><?xml version="1.0" encoding="utf-8"?>
 <p:sld xmlns:a="http://schemas.openxmlformats.org/drawingml/2006/main" xmlns:r="http://schemas.openxmlformats.org/officeDocument/2006/relationships" xmlns:p="http://schemas.openxmlformats.org/presentationml/2006/main">
   <p:cSld>
     <p:spTree>
@@ -8337,7 +8537,7 @@
 </p:sld>
 </file>
 
-<file path=ppt/slides/slide17.xml><?xml version="1.0" encoding="utf-8"?>
+<file path=ppt/slides/slide18.xml><?xml version="1.0" encoding="utf-8"?>
 <p:sld xmlns:a="http://schemas.openxmlformats.org/drawingml/2006/main" xmlns:r="http://schemas.openxmlformats.org/officeDocument/2006/relationships" xmlns:p="http://schemas.openxmlformats.org/presentationml/2006/main">
   <p:cSld>
     <p:spTree>
@@ -8514,7 +8714,7 @@
 </p:sld>
 </file>
 
-<file path=ppt/slides/slide18.xml><?xml version="1.0" encoding="utf-8"?>
+<file path=ppt/slides/slide19.xml><?xml version="1.0" encoding="utf-8"?>
 <p:sld xmlns:a="http://schemas.openxmlformats.org/drawingml/2006/main" xmlns:r="http://schemas.openxmlformats.org/officeDocument/2006/relationships" xmlns:p="http://schemas.openxmlformats.org/presentationml/2006/main">
   <p:cSld>
     <p:spTree>
@@ -8708,278 +8908,6 @@
     <p:extLst>
       <p:ext uri="{BB962C8B-B14F-4D97-AF65-F5344CB8AC3E}">
         <p14:creationId xmlns:p14="http://schemas.microsoft.com/office/powerpoint/2010/main" val="3466176843"/>
-      </p:ext>
-    </p:extLst>
-  </p:cSld>
-  <p:clrMapOvr>
-    <a:masterClrMapping/>
-  </p:clrMapOvr>
-</p:sld>
-</file>
-
-<file path=ppt/slides/slide19.xml><?xml version="1.0" encoding="utf-8"?>
-<p:sld xmlns:a="http://schemas.openxmlformats.org/drawingml/2006/main" xmlns:r="http://schemas.openxmlformats.org/officeDocument/2006/relationships" xmlns:p="http://schemas.openxmlformats.org/presentationml/2006/main">
-  <p:cSld>
-    <p:spTree>
-      <p:nvGrpSpPr>
-        <p:cNvPr id="1" name="">
-          <a:extLst>
-            <a:ext uri="{FF2B5EF4-FFF2-40B4-BE49-F238E27FC236}">
-              <a16:creationId xmlns:a16="http://schemas.microsoft.com/office/drawing/2014/main" id="{7BC7F4CA-4E65-9400-9C41-AF44E4F4F69A}"/>
-            </a:ext>
-          </a:extLst>
-        </p:cNvPr>
-        <p:cNvGrpSpPr/>
-        <p:nvPr/>
-      </p:nvGrpSpPr>
-      <p:grpSpPr>
-        <a:xfrm>
-          <a:off x="0" y="0"/>
-          <a:ext cx="0" cy="0"/>
-          <a:chOff x="0" y="0"/>
-          <a:chExt cx="0" cy="0"/>
-        </a:xfrm>
-      </p:grpSpPr>
-      <p:sp>
-        <p:nvSpPr>
-          <p:cNvPr id="2" name="Title 1">
-            <a:extLst>
-              <a:ext uri="{FF2B5EF4-FFF2-40B4-BE49-F238E27FC236}">
-                <a16:creationId xmlns:a16="http://schemas.microsoft.com/office/drawing/2014/main" id="{02DFA93A-EB2E-6E5D-DF8D-99EE3D93326F}"/>
-              </a:ext>
-            </a:extLst>
-          </p:cNvPr>
-          <p:cNvSpPr>
-            <a:spLocks noGrp="1"/>
-          </p:cNvSpPr>
-          <p:nvPr>
-            <p:ph type="title"/>
-          </p:nvPr>
-        </p:nvSpPr>
-        <p:spPr>
-          <a:xfrm>
-            <a:off x="458694" y="50005"/>
-            <a:ext cx="10895106" cy="1325563"/>
-          </a:xfrm>
-        </p:spPr>
-        <p:txBody>
-          <a:bodyPr/>
-          <a:lstStyle/>
-          <a:p>
-            <a:r>
-              <a:rPr lang="en-US" dirty="0"/>
-              <a:t>Interpretation</a:t>
-            </a:r>
-          </a:p>
-        </p:txBody>
-      </p:sp>
-      <p:pic>
-        <p:nvPicPr>
-          <p:cNvPr id="7" name="Picture 6" descr="A screenshot of a computer&#10;&#10;Description automatically generated">
-            <a:extLst>
-              <a:ext uri="{FF2B5EF4-FFF2-40B4-BE49-F238E27FC236}">
-                <a16:creationId xmlns:a16="http://schemas.microsoft.com/office/drawing/2014/main" id="{2B1EF225-0DCD-6535-3F7E-73E4FE93B179}"/>
-              </a:ext>
-            </a:extLst>
-          </p:cNvPr>
-          <p:cNvPicPr>
-            <a:picLocks noChangeAspect="1"/>
-          </p:cNvPicPr>
-          <p:nvPr/>
-        </p:nvPicPr>
-        <p:blipFill>
-          <a:blip r:embed="rId2"/>
-          <a:stretch>
-            <a:fillRect/>
-          </a:stretch>
-        </p:blipFill>
-        <p:spPr>
-          <a:xfrm>
-            <a:off x="162468" y="1828800"/>
-            <a:ext cx="6160746" cy="4618038"/>
-          </a:xfrm>
-          <a:prstGeom prst="rect">
-            <a:avLst/>
-          </a:prstGeom>
-        </p:spPr>
-      </p:pic>
-      <p:sp>
-        <p:nvSpPr>
-          <p:cNvPr id="3" name="TextBox 2">
-            <a:extLst>
-              <a:ext uri="{FF2B5EF4-FFF2-40B4-BE49-F238E27FC236}">
-                <a16:creationId xmlns:a16="http://schemas.microsoft.com/office/drawing/2014/main" id="{D706A00C-2FFB-E2AE-EDCC-B585C81031FA}"/>
-              </a:ext>
-            </a:extLst>
-          </p:cNvPr>
-          <p:cNvSpPr txBox="1"/>
-          <p:nvPr/>
-        </p:nvSpPr>
-        <p:spPr>
-          <a:xfrm>
-            <a:off x="6985366" y="330456"/>
-            <a:ext cx="4869363" cy="5632311"/>
-          </a:xfrm>
-          <a:prstGeom prst="rect">
-            <a:avLst/>
-          </a:prstGeom>
-          <a:noFill/>
-        </p:spPr>
-        <p:txBody>
-          <a:bodyPr wrap="square" rtlCol="0">
-            <a:spAutoFit/>
-          </a:bodyPr>
-          <a:lstStyle/>
-          <a:p>
-            <a:r>
-              <a:rPr lang="en-US" b="1" dirty="0">
-                <a:effectLst/>
-              </a:rPr>
-              <a:t>Is regression model significant?</a:t>
-            </a:r>
-          </a:p>
-          <a:p>
-            <a:pPr marL="342900" indent="-342900">
-              <a:buFont typeface="+mj-lt"/>
-              <a:buAutoNum type="arabicPeriod"/>
-            </a:pPr>
-            <a:endParaRPr lang="en-US" dirty="0">
-              <a:effectLst/>
-            </a:endParaRPr>
-          </a:p>
-          <a:p>
-            <a:pPr marL="285750" indent="-285750">
-              <a:buFont typeface="Arial" panose="020B0604020202020204" pitchFamily="34" charset="0"/>
-              <a:buChar char="•"/>
-            </a:pPr>
-            <a:r>
-              <a:rPr lang="en-US" dirty="0"/>
-              <a:t>F-statistic = </a:t>
-            </a:r>
-          </a:p>
-          <a:p>
-            <a:pPr marL="285750" indent="-285750">
-              <a:buFont typeface="Arial" panose="020B0604020202020204" pitchFamily="34" charset="0"/>
-              <a:buChar char="•"/>
-            </a:pPr>
-            <a:endParaRPr lang="en-US" dirty="0"/>
-          </a:p>
-          <a:p>
-            <a:pPr marL="285750" indent="-285750">
-              <a:buFont typeface="Arial" panose="020B0604020202020204" pitchFamily="34" charset="0"/>
-              <a:buChar char="•"/>
-            </a:pPr>
-            <a:r>
-              <a:rPr lang="en-US" dirty="0"/>
-              <a:t>R2 = </a:t>
-            </a:r>
-          </a:p>
-          <a:p>
-            <a:pPr marL="285750" indent="-285750">
-              <a:buFont typeface="Arial" panose="020B0604020202020204" pitchFamily="34" charset="0"/>
-              <a:buChar char="•"/>
-            </a:pPr>
-            <a:endParaRPr lang="en-US" dirty="0">
-              <a:effectLst/>
-            </a:endParaRPr>
-          </a:p>
-          <a:p>
-            <a:pPr marL="285750" indent="-285750">
-              <a:buFont typeface="Arial" panose="020B0604020202020204" pitchFamily="34" charset="0"/>
-              <a:buChar char="•"/>
-            </a:pPr>
-            <a:r>
-              <a:rPr lang="en-US" dirty="0">
-                <a:effectLst/>
-              </a:rPr>
-              <a:t>Adj R2 = </a:t>
-            </a:r>
-          </a:p>
-          <a:p>
-            <a:endParaRPr lang="en-US" dirty="0">
-              <a:effectLst/>
-            </a:endParaRPr>
-          </a:p>
-          <a:p>
-            <a:r>
-              <a:rPr lang="en-US" dirty="0"/>
-              <a:t>R2 Interpretation: </a:t>
-            </a:r>
-            <a:br>
-              <a:rPr lang="en-US" dirty="0">
-                <a:effectLst/>
-              </a:rPr>
-            </a:br>
-            <a:endParaRPr lang="en-US" dirty="0">
-              <a:effectLst/>
-            </a:endParaRPr>
-          </a:p>
-          <a:p>
-            <a:endParaRPr lang="en-US" dirty="0">
-              <a:effectLst/>
-            </a:endParaRPr>
-          </a:p>
-          <a:p>
-            <a:r>
-              <a:rPr lang="en-US" b="1" dirty="0">
-                <a:effectLst/>
-              </a:rPr>
-              <a:t>Is the relationship between BMI and insurance premium significant?</a:t>
-            </a:r>
-          </a:p>
-          <a:p>
-            <a:endParaRPr lang="en-US" dirty="0"/>
-          </a:p>
-          <a:p>
-            <a:pPr marL="285750" indent="-285750">
-              <a:buFont typeface="Arial" panose="020B0604020202020204" pitchFamily="34" charset="0"/>
-              <a:buChar char="•"/>
-            </a:pPr>
-            <a:r>
-              <a:rPr lang="en-US" dirty="0">
-                <a:effectLst/>
-              </a:rPr>
-              <a:t>P-value = </a:t>
-            </a:r>
-          </a:p>
-          <a:p>
-            <a:pPr marL="285750" indent="-285750">
-              <a:buFont typeface="Arial" panose="020B0604020202020204" pitchFamily="34" charset="0"/>
-              <a:buChar char="•"/>
-            </a:pPr>
-            <a:endParaRPr lang="en-US" dirty="0"/>
-          </a:p>
-          <a:p>
-            <a:r>
-              <a:rPr lang="en-US" b="1" dirty="0">
-                <a:effectLst/>
-              </a:rPr>
-              <a:t>Slope Interpretation:</a:t>
-            </a:r>
-          </a:p>
-          <a:p>
-            <a:endParaRPr lang="en-US" dirty="0"/>
-          </a:p>
-          <a:p>
-            <a:endParaRPr lang="en-US" dirty="0">
-              <a:effectLst/>
-            </a:endParaRPr>
-          </a:p>
-          <a:p>
-            <a:r>
-              <a:rPr lang="en-US" b="1" dirty="0"/>
-              <a:t>Intercept Interpretation:</a:t>
-            </a:r>
-            <a:endParaRPr lang="en-US" b="1" dirty="0">
-              <a:effectLst/>
-            </a:endParaRPr>
-          </a:p>
-        </p:txBody>
-      </p:sp>
-    </p:spTree>
-    <p:extLst>
-      <p:ext uri="{BB962C8B-B14F-4D97-AF65-F5344CB8AC3E}">
-        <p14:creationId xmlns:p14="http://schemas.microsoft.com/office/powerpoint/2010/main" val="2388630133"/>
       </p:ext>
     </p:extLst>
   </p:cSld>
@@ -9197,6 +9125,278 @@
   <p:cSld>
     <p:spTree>
       <p:nvGrpSpPr>
+        <p:cNvPr id="1" name="">
+          <a:extLst>
+            <a:ext uri="{FF2B5EF4-FFF2-40B4-BE49-F238E27FC236}">
+              <a16:creationId xmlns:a16="http://schemas.microsoft.com/office/drawing/2014/main" id="{7BC7F4CA-4E65-9400-9C41-AF44E4F4F69A}"/>
+            </a:ext>
+          </a:extLst>
+        </p:cNvPr>
+        <p:cNvGrpSpPr/>
+        <p:nvPr/>
+      </p:nvGrpSpPr>
+      <p:grpSpPr>
+        <a:xfrm>
+          <a:off x="0" y="0"/>
+          <a:ext cx="0" cy="0"/>
+          <a:chOff x="0" y="0"/>
+          <a:chExt cx="0" cy="0"/>
+        </a:xfrm>
+      </p:grpSpPr>
+      <p:sp>
+        <p:nvSpPr>
+          <p:cNvPr id="2" name="Title 1">
+            <a:extLst>
+              <a:ext uri="{FF2B5EF4-FFF2-40B4-BE49-F238E27FC236}">
+                <a16:creationId xmlns:a16="http://schemas.microsoft.com/office/drawing/2014/main" id="{02DFA93A-EB2E-6E5D-DF8D-99EE3D93326F}"/>
+              </a:ext>
+            </a:extLst>
+          </p:cNvPr>
+          <p:cNvSpPr>
+            <a:spLocks noGrp="1"/>
+          </p:cNvSpPr>
+          <p:nvPr>
+            <p:ph type="title"/>
+          </p:nvPr>
+        </p:nvSpPr>
+        <p:spPr>
+          <a:xfrm>
+            <a:off x="458694" y="50005"/>
+            <a:ext cx="10895106" cy="1325563"/>
+          </a:xfrm>
+        </p:spPr>
+        <p:txBody>
+          <a:bodyPr/>
+          <a:lstStyle/>
+          <a:p>
+            <a:r>
+              <a:rPr lang="en-US" dirty="0"/>
+              <a:t>Interpretation</a:t>
+            </a:r>
+          </a:p>
+        </p:txBody>
+      </p:sp>
+      <p:pic>
+        <p:nvPicPr>
+          <p:cNvPr id="7" name="Picture 6" descr="A screenshot of a computer&#10;&#10;Description automatically generated">
+            <a:extLst>
+              <a:ext uri="{FF2B5EF4-FFF2-40B4-BE49-F238E27FC236}">
+                <a16:creationId xmlns:a16="http://schemas.microsoft.com/office/drawing/2014/main" id="{2B1EF225-0DCD-6535-3F7E-73E4FE93B179}"/>
+              </a:ext>
+            </a:extLst>
+          </p:cNvPr>
+          <p:cNvPicPr>
+            <a:picLocks noChangeAspect="1"/>
+          </p:cNvPicPr>
+          <p:nvPr/>
+        </p:nvPicPr>
+        <p:blipFill>
+          <a:blip r:embed="rId2"/>
+          <a:stretch>
+            <a:fillRect/>
+          </a:stretch>
+        </p:blipFill>
+        <p:spPr>
+          <a:xfrm>
+            <a:off x="162468" y="1828800"/>
+            <a:ext cx="6160746" cy="4618038"/>
+          </a:xfrm>
+          <a:prstGeom prst="rect">
+            <a:avLst/>
+          </a:prstGeom>
+        </p:spPr>
+      </p:pic>
+      <p:sp>
+        <p:nvSpPr>
+          <p:cNvPr id="3" name="TextBox 2">
+            <a:extLst>
+              <a:ext uri="{FF2B5EF4-FFF2-40B4-BE49-F238E27FC236}">
+                <a16:creationId xmlns:a16="http://schemas.microsoft.com/office/drawing/2014/main" id="{D706A00C-2FFB-E2AE-EDCC-B585C81031FA}"/>
+              </a:ext>
+            </a:extLst>
+          </p:cNvPr>
+          <p:cNvSpPr txBox="1"/>
+          <p:nvPr/>
+        </p:nvSpPr>
+        <p:spPr>
+          <a:xfrm>
+            <a:off x="6985366" y="330456"/>
+            <a:ext cx="4869363" cy="5632311"/>
+          </a:xfrm>
+          <a:prstGeom prst="rect">
+            <a:avLst/>
+          </a:prstGeom>
+          <a:noFill/>
+        </p:spPr>
+        <p:txBody>
+          <a:bodyPr wrap="square" rtlCol="0">
+            <a:spAutoFit/>
+          </a:bodyPr>
+          <a:lstStyle/>
+          <a:p>
+            <a:r>
+              <a:rPr lang="en-US" b="1" dirty="0">
+                <a:effectLst/>
+              </a:rPr>
+              <a:t>Is regression model significant?</a:t>
+            </a:r>
+          </a:p>
+          <a:p>
+            <a:pPr marL="342900" indent="-342900">
+              <a:buFont typeface="+mj-lt"/>
+              <a:buAutoNum type="arabicPeriod"/>
+            </a:pPr>
+            <a:endParaRPr lang="en-US" dirty="0">
+              <a:effectLst/>
+            </a:endParaRPr>
+          </a:p>
+          <a:p>
+            <a:pPr marL="285750" indent="-285750">
+              <a:buFont typeface="Arial" panose="020B0604020202020204" pitchFamily="34" charset="0"/>
+              <a:buChar char="•"/>
+            </a:pPr>
+            <a:r>
+              <a:rPr lang="en-US" dirty="0"/>
+              <a:t>F-statistic = </a:t>
+            </a:r>
+          </a:p>
+          <a:p>
+            <a:pPr marL="285750" indent="-285750">
+              <a:buFont typeface="Arial" panose="020B0604020202020204" pitchFamily="34" charset="0"/>
+              <a:buChar char="•"/>
+            </a:pPr>
+            <a:endParaRPr lang="en-US" dirty="0"/>
+          </a:p>
+          <a:p>
+            <a:pPr marL="285750" indent="-285750">
+              <a:buFont typeface="Arial" panose="020B0604020202020204" pitchFamily="34" charset="0"/>
+              <a:buChar char="•"/>
+            </a:pPr>
+            <a:r>
+              <a:rPr lang="en-US" dirty="0"/>
+              <a:t>R2 = </a:t>
+            </a:r>
+          </a:p>
+          <a:p>
+            <a:pPr marL="285750" indent="-285750">
+              <a:buFont typeface="Arial" panose="020B0604020202020204" pitchFamily="34" charset="0"/>
+              <a:buChar char="•"/>
+            </a:pPr>
+            <a:endParaRPr lang="en-US" dirty="0">
+              <a:effectLst/>
+            </a:endParaRPr>
+          </a:p>
+          <a:p>
+            <a:pPr marL="285750" indent="-285750">
+              <a:buFont typeface="Arial" panose="020B0604020202020204" pitchFamily="34" charset="0"/>
+              <a:buChar char="•"/>
+            </a:pPr>
+            <a:r>
+              <a:rPr lang="en-US" dirty="0">
+                <a:effectLst/>
+              </a:rPr>
+              <a:t>Adj R2 = </a:t>
+            </a:r>
+          </a:p>
+          <a:p>
+            <a:endParaRPr lang="en-US" dirty="0">
+              <a:effectLst/>
+            </a:endParaRPr>
+          </a:p>
+          <a:p>
+            <a:r>
+              <a:rPr lang="en-US" dirty="0"/>
+              <a:t>R2 Interpretation: </a:t>
+            </a:r>
+            <a:br>
+              <a:rPr lang="en-US" dirty="0">
+                <a:effectLst/>
+              </a:rPr>
+            </a:br>
+            <a:endParaRPr lang="en-US" dirty="0">
+              <a:effectLst/>
+            </a:endParaRPr>
+          </a:p>
+          <a:p>
+            <a:endParaRPr lang="en-US" dirty="0">
+              <a:effectLst/>
+            </a:endParaRPr>
+          </a:p>
+          <a:p>
+            <a:r>
+              <a:rPr lang="en-US" b="1" dirty="0">
+                <a:effectLst/>
+              </a:rPr>
+              <a:t>Is the relationship between BMI and insurance premium significant?</a:t>
+            </a:r>
+          </a:p>
+          <a:p>
+            <a:endParaRPr lang="en-US" dirty="0"/>
+          </a:p>
+          <a:p>
+            <a:pPr marL="285750" indent="-285750">
+              <a:buFont typeface="Arial" panose="020B0604020202020204" pitchFamily="34" charset="0"/>
+              <a:buChar char="•"/>
+            </a:pPr>
+            <a:r>
+              <a:rPr lang="en-US" dirty="0">
+                <a:effectLst/>
+              </a:rPr>
+              <a:t>P-value = </a:t>
+            </a:r>
+          </a:p>
+          <a:p>
+            <a:pPr marL="285750" indent="-285750">
+              <a:buFont typeface="Arial" panose="020B0604020202020204" pitchFamily="34" charset="0"/>
+              <a:buChar char="•"/>
+            </a:pPr>
+            <a:endParaRPr lang="en-US" dirty="0"/>
+          </a:p>
+          <a:p>
+            <a:r>
+              <a:rPr lang="en-US" b="1" dirty="0">
+                <a:effectLst/>
+              </a:rPr>
+              <a:t>Slope Interpretation:</a:t>
+            </a:r>
+          </a:p>
+          <a:p>
+            <a:endParaRPr lang="en-US" dirty="0"/>
+          </a:p>
+          <a:p>
+            <a:endParaRPr lang="en-US" dirty="0">
+              <a:effectLst/>
+            </a:endParaRPr>
+          </a:p>
+          <a:p>
+            <a:r>
+              <a:rPr lang="en-US" b="1" dirty="0"/>
+              <a:t>Intercept Interpretation:</a:t>
+            </a:r>
+            <a:endParaRPr lang="en-US" b="1" dirty="0">
+              <a:effectLst/>
+            </a:endParaRPr>
+          </a:p>
+        </p:txBody>
+      </p:sp>
+    </p:spTree>
+    <p:extLst>
+      <p:ext uri="{BB962C8B-B14F-4D97-AF65-F5344CB8AC3E}">
+        <p14:creationId xmlns:p14="http://schemas.microsoft.com/office/powerpoint/2010/main" val="2388630133"/>
+      </p:ext>
+    </p:extLst>
+  </p:cSld>
+  <p:clrMapOvr>
+    <a:masterClrMapping/>
+  </p:clrMapOvr>
+</p:sld>
+</file>
+
+<file path=ppt/slides/slide21.xml><?xml version="1.0" encoding="utf-8"?>
+<p:sld xmlns:a="http://schemas.openxmlformats.org/drawingml/2006/main" xmlns:r="http://schemas.openxmlformats.org/officeDocument/2006/relationships" xmlns:p="http://schemas.openxmlformats.org/presentationml/2006/main">
+  <p:cSld>
+    <p:spTree>
+      <p:nvGrpSpPr>
         <p:cNvPr id="1" name=""/>
         <p:cNvGrpSpPr/>
         <p:nvPr/>
@@ -9425,7 +9625,7 @@
 </p:sld>
 </file>
 
-<file path=ppt/slides/slide21.xml><?xml version="1.0" encoding="utf-8"?>
+<file path=ppt/slides/slide22.xml><?xml version="1.0" encoding="utf-8"?>
 <p:sld xmlns:a="http://schemas.openxmlformats.org/drawingml/2006/main" xmlns:r="http://schemas.openxmlformats.org/officeDocument/2006/relationships" xmlns:p="http://schemas.openxmlformats.org/presentationml/2006/main">
   <p:cSld>
     <p:spTree>
@@ -9559,7 +9759,7 @@
 </p:sld>
 </file>
 
-<file path=ppt/slides/slide22.xml><?xml version="1.0" encoding="utf-8"?>
+<file path=ppt/slides/slide23.xml><?xml version="1.0" encoding="utf-8"?>
 <p:sld xmlns:a="http://schemas.openxmlformats.org/drawingml/2006/main" xmlns:r="http://schemas.openxmlformats.org/officeDocument/2006/relationships" xmlns:p="http://schemas.openxmlformats.org/presentationml/2006/main">
   <p:cSld>
     <p:spTree>
@@ -9806,7 +10006,7 @@
 </p:sld>
 </file>
 
-<file path=ppt/slides/slide23.xml><?xml version="1.0" encoding="utf-8"?>
+<file path=ppt/slides/slide24.xml><?xml version="1.0" encoding="utf-8"?>
 <p:sld xmlns:a="http://schemas.openxmlformats.org/drawingml/2006/main" xmlns:r="http://schemas.openxmlformats.org/officeDocument/2006/relationships" xmlns:p="http://schemas.openxmlformats.org/presentationml/2006/main">
   <p:cSld>
     <p:spTree>
@@ -10007,7 +10207,7 @@
 </p:sld>
 </file>
 
-<file path=ppt/slides/slide24.xml><?xml version="1.0" encoding="utf-8"?>
+<file path=ppt/slides/slide25.xml><?xml version="1.0" encoding="utf-8"?>
 <p:sld xmlns:a="http://schemas.openxmlformats.org/drawingml/2006/main" xmlns:r="http://schemas.openxmlformats.org/officeDocument/2006/relationships" xmlns:p="http://schemas.openxmlformats.org/presentationml/2006/main">
   <p:cSld>
     <p:bg>
@@ -10393,111 +10593,6 @@
 </p:sld>
 </file>
 
-<file path=ppt/slides/slide25.xml><?xml version="1.0" encoding="utf-8"?>
-<p:sld xmlns:a="http://schemas.openxmlformats.org/drawingml/2006/main" xmlns:r="http://schemas.openxmlformats.org/officeDocument/2006/relationships" xmlns:p="http://schemas.openxmlformats.org/presentationml/2006/main">
-  <p:cSld>
-    <p:spTree>
-      <p:nvGrpSpPr>
-        <p:cNvPr id="1" name=""/>
-        <p:cNvGrpSpPr/>
-        <p:nvPr/>
-      </p:nvGrpSpPr>
-      <p:grpSpPr>
-        <a:xfrm>
-          <a:off x="0" y="0"/>
-          <a:ext cx="0" cy="0"/>
-          <a:chOff x="0" y="0"/>
-          <a:chExt cx="0" cy="0"/>
-        </a:xfrm>
-      </p:grpSpPr>
-      <p:sp>
-        <p:nvSpPr>
-          <p:cNvPr id="2" name="Title 1">
-            <a:extLst>
-              <a:ext uri="{FF2B5EF4-FFF2-40B4-BE49-F238E27FC236}">
-                <a16:creationId xmlns:a16="http://schemas.microsoft.com/office/drawing/2014/main" id="{ADE8E07D-4BD4-C85C-4FF2-72499EAAFEC2}"/>
-              </a:ext>
-            </a:extLst>
-          </p:cNvPr>
-          <p:cNvSpPr>
-            <a:spLocks noGrp="1"/>
-          </p:cNvSpPr>
-          <p:nvPr>
-            <p:ph type="title"/>
-          </p:nvPr>
-        </p:nvSpPr>
-        <p:spPr/>
-        <p:txBody>
-          <a:bodyPr/>
-          <a:lstStyle/>
-          <a:p>
-            <a:r>
-              <a:rPr lang="en-US" dirty="0"/>
-              <a:t>In-class Quiz</a:t>
-            </a:r>
-          </a:p>
-        </p:txBody>
-      </p:sp>
-      <p:sp>
-        <p:nvSpPr>
-          <p:cNvPr id="3" name="Content Placeholder 2">
-            <a:extLst>
-              <a:ext uri="{FF2B5EF4-FFF2-40B4-BE49-F238E27FC236}">
-                <a16:creationId xmlns:a16="http://schemas.microsoft.com/office/drawing/2014/main" id="{F1C58F58-9411-E532-5A2E-34743680C024}"/>
-              </a:ext>
-            </a:extLst>
-          </p:cNvPr>
-          <p:cNvSpPr>
-            <a:spLocks noGrp="1"/>
-          </p:cNvSpPr>
-          <p:nvPr>
-            <p:ph idx="1"/>
-          </p:nvPr>
-        </p:nvSpPr>
-        <p:spPr/>
-        <p:txBody>
-          <a:bodyPr/>
-          <a:lstStyle/>
-          <a:p>
-            <a:r>
-              <a:rPr lang="en-US" dirty="0"/>
-              <a:t>Let’s see how much we understood from today’s class so far</a:t>
-            </a:r>
-          </a:p>
-          <a:p>
-            <a:r>
-              <a:rPr lang="en-US" dirty="0"/>
-              <a:t>Visit </a:t>
-            </a:r>
-            <a:r>
-              <a:rPr lang="en-US" dirty="0">
-                <a:hlinkClick r:id="rId2"/>
-              </a:rPr>
-              <a:t>https://play.blooket.com/</a:t>
-            </a:r>
-            <a:r>
-              <a:rPr lang="en-US" dirty="0"/>
-              <a:t> and enter code XXXXXX</a:t>
-            </a:r>
-          </a:p>
-          <a:p>
-            <a:endParaRPr lang="en-US" dirty="0"/>
-          </a:p>
-        </p:txBody>
-      </p:sp>
-    </p:spTree>
-    <p:extLst>
-      <p:ext uri="{BB962C8B-B14F-4D97-AF65-F5344CB8AC3E}">
-        <p14:creationId xmlns:p14="http://schemas.microsoft.com/office/powerpoint/2010/main" val="799678541"/>
-      </p:ext>
-    </p:extLst>
-  </p:cSld>
-  <p:clrMapOvr>
-    <a:masterClrMapping/>
-  </p:clrMapOvr>
-</p:sld>
-</file>
-
 <file path=ppt/slides/slide26.xml><?xml version="1.0" encoding="utf-8"?>
 <p:sld xmlns:a="http://schemas.openxmlformats.org/drawingml/2006/main" xmlns:r="http://schemas.openxmlformats.org/officeDocument/2006/relationships" xmlns:p="http://schemas.openxmlformats.org/presentationml/2006/main">
   <p:cSld>
@@ -10520,6 +10615,111 @@
           <p:cNvPr id="2" name="Title 1">
             <a:extLst>
               <a:ext uri="{FF2B5EF4-FFF2-40B4-BE49-F238E27FC236}">
+                <a16:creationId xmlns:a16="http://schemas.microsoft.com/office/drawing/2014/main" id="{ADE8E07D-4BD4-C85C-4FF2-72499EAAFEC2}"/>
+              </a:ext>
+            </a:extLst>
+          </p:cNvPr>
+          <p:cNvSpPr>
+            <a:spLocks noGrp="1"/>
+          </p:cNvSpPr>
+          <p:nvPr>
+            <p:ph type="title"/>
+          </p:nvPr>
+        </p:nvSpPr>
+        <p:spPr/>
+        <p:txBody>
+          <a:bodyPr/>
+          <a:lstStyle/>
+          <a:p>
+            <a:r>
+              <a:rPr lang="en-US" dirty="0"/>
+              <a:t>In-class Quiz</a:t>
+            </a:r>
+          </a:p>
+        </p:txBody>
+      </p:sp>
+      <p:sp>
+        <p:nvSpPr>
+          <p:cNvPr id="3" name="Content Placeholder 2">
+            <a:extLst>
+              <a:ext uri="{FF2B5EF4-FFF2-40B4-BE49-F238E27FC236}">
+                <a16:creationId xmlns:a16="http://schemas.microsoft.com/office/drawing/2014/main" id="{F1C58F58-9411-E532-5A2E-34743680C024}"/>
+              </a:ext>
+            </a:extLst>
+          </p:cNvPr>
+          <p:cNvSpPr>
+            <a:spLocks noGrp="1"/>
+          </p:cNvSpPr>
+          <p:nvPr>
+            <p:ph idx="1"/>
+          </p:nvPr>
+        </p:nvSpPr>
+        <p:spPr/>
+        <p:txBody>
+          <a:bodyPr/>
+          <a:lstStyle/>
+          <a:p>
+            <a:r>
+              <a:rPr lang="en-US" dirty="0"/>
+              <a:t>Let’s see how much we understood from today’s class so far</a:t>
+            </a:r>
+          </a:p>
+          <a:p>
+            <a:r>
+              <a:rPr lang="en-US" dirty="0"/>
+              <a:t>Visit </a:t>
+            </a:r>
+            <a:r>
+              <a:rPr lang="en-US" dirty="0">
+                <a:hlinkClick r:id="rId2"/>
+              </a:rPr>
+              <a:t>https://play.blooket.com/</a:t>
+            </a:r>
+            <a:r>
+              <a:rPr lang="en-US" dirty="0"/>
+              <a:t> and enter code XXXXXX</a:t>
+            </a:r>
+          </a:p>
+          <a:p>
+            <a:endParaRPr lang="en-US" dirty="0"/>
+          </a:p>
+        </p:txBody>
+      </p:sp>
+    </p:spTree>
+    <p:extLst>
+      <p:ext uri="{BB962C8B-B14F-4D97-AF65-F5344CB8AC3E}">
+        <p14:creationId xmlns:p14="http://schemas.microsoft.com/office/powerpoint/2010/main" val="799678541"/>
+      </p:ext>
+    </p:extLst>
+  </p:cSld>
+  <p:clrMapOvr>
+    <a:masterClrMapping/>
+  </p:clrMapOvr>
+</p:sld>
+</file>
+
+<file path=ppt/slides/slide27.xml><?xml version="1.0" encoding="utf-8"?>
+<p:sld xmlns:a="http://schemas.openxmlformats.org/drawingml/2006/main" xmlns:r="http://schemas.openxmlformats.org/officeDocument/2006/relationships" xmlns:p="http://schemas.openxmlformats.org/presentationml/2006/main">
+  <p:cSld>
+    <p:spTree>
+      <p:nvGrpSpPr>
+        <p:cNvPr id="1" name=""/>
+        <p:cNvGrpSpPr/>
+        <p:nvPr/>
+      </p:nvGrpSpPr>
+      <p:grpSpPr>
+        <a:xfrm>
+          <a:off x="0" y="0"/>
+          <a:ext cx="0" cy="0"/>
+          <a:chOff x="0" y="0"/>
+          <a:chExt cx="0" cy="0"/>
+        </a:xfrm>
+      </p:grpSpPr>
+      <p:sp>
+        <p:nvSpPr>
+          <p:cNvPr id="2" name="Title 1">
+            <a:extLst>
+              <a:ext uri="{FF2B5EF4-FFF2-40B4-BE49-F238E27FC236}">
                 <a16:creationId xmlns:a16="http://schemas.microsoft.com/office/drawing/2014/main" id="{7F06509D-FC3F-BF19-B999-D9A9D03CCD1C}"/>
               </a:ext>
             </a:extLst>
@@ -10584,7 +10784,7 @@
 </p:sld>
 </file>
 
-<file path=ppt/slides/slide27.xml><?xml version="1.0" encoding="utf-8"?>
+<file path=ppt/slides/slide28.xml><?xml version="1.0" encoding="utf-8"?>
 <p:sld xmlns:a="http://schemas.openxmlformats.org/drawingml/2006/main" xmlns:r="http://schemas.openxmlformats.org/officeDocument/2006/relationships" xmlns:p="http://schemas.openxmlformats.org/presentationml/2006/main">
   <p:cSld>
     <p:spTree>
@@ -10829,7 +11029,7 @@
 </p:sld>
 </file>
 
-<file path=ppt/slides/slide28.xml><?xml version="1.0" encoding="utf-8"?>
+<file path=ppt/slides/slide29.xml><?xml version="1.0" encoding="utf-8"?>
 <p:sld xmlns:a="http://schemas.openxmlformats.org/drawingml/2006/main" xmlns:r="http://schemas.openxmlformats.org/officeDocument/2006/relationships" xmlns:p="http://schemas.openxmlformats.org/presentationml/2006/main">
   <p:cSld>
     <p:spTree>
@@ -11083,235 +11283,6 @@
     <p:extLst>
       <p:ext uri="{BB962C8B-B14F-4D97-AF65-F5344CB8AC3E}">
         <p14:creationId xmlns:p14="http://schemas.microsoft.com/office/powerpoint/2010/main" val="1211321221"/>
-      </p:ext>
-    </p:extLst>
-  </p:cSld>
-  <p:clrMapOvr>
-    <a:masterClrMapping/>
-  </p:clrMapOvr>
-</p:sld>
-</file>
-
-<file path=ppt/slides/slide29.xml><?xml version="1.0" encoding="utf-8"?>
-<p:sld xmlns:a="http://schemas.openxmlformats.org/drawingml/2006/main" xmlns:r="http://schemas.openxmlformats.org/officeDocument/2006/relationships" xmlns:p="http://schemas.openxmlformats.org/presentationml/2006/main">
-  <p:cSld>
-    <p:spTree>
-      <p:nvGrpSpPr>
-        <p:cNvPr id="1" name=""/>
-        <p:cNvGrpSpPr/>
-        <p:nvPr/>
-      </p:nvGrpSpPr>
-      <p:grpSpPr>
-        <a:xfrm>
-          <a:off x="0" y="0"/>
-          <a:ext cx="0" cy="0"/>
-          <a:chOff x="0" y="0"/>
-          <a:chExt cx="0" cy="0"/>
-        </a:xfrm>
-      </p:grpSpPr>
-      <p:sp>
-        <p:nvSpPr>
-          <p:cNvPr id="2" name="Title 1">
-            <a:extLst>
-              <a:ext uri="{FF2B5EF4-FFF2-40B4-BE49-F238E27FC236}">
-                <a16:creationId xmlns:a16="http://schemas.microsoft.com/office/drawing/2014/main" id="{90705B0B-3B33-9B5C-F158-DEAAAEC8C05F}"/>
-              </a:ext>
-            </a:extLst>
-          </p:cNvPr>
-          <p:cNvSpPr>
-            <a:spLocks noGrp="1"/>
-          </p:cNvSpPr>
-          <p:nvPr>
-            <p:ph type="title"/>
-          </p:nvPr>
-        </p:nvSpPr>
-        <p:spPr>
-          <a:xfrm>
-            <a:off x="458695" y="18255"/>
-            <a:ext cx="10895106" cy="1325563"/>
-          </a:xfrm>
-        </p:spPr>
-        <p:txBody>
-          <a:bodyPr/>
-          <a:lstStyle/>
-          <a:p>
-            <a:r>
-              <a:rPr lang="en-US" dirty="0"/>
-              <a:t>Concluding Remarks</a:t>
-            </a:r>
-          </a:p>
-        </p:txBody>
-      </p:sp>
-      <p:sp>
-        <p:nvSpPr>
-          <p:cNvPr id="3" name="Content Placeholder 2">
-            <a:extLst>
-              <a:ext uri="{FF2B5EF4-FFF2-40B4-BE49-F238E27FC236}">
-                <a16:creationId xmlns:a16="http://schemas.microsoft.com/office/drawing/2014/main" id="{9CE956AE-7039-39B6-F94E-3EC7FE476B45}"/>
-              </a:ext>
-            </a:extLst>
-          </p:cNvPr>
-          <p:cNvSpPr>
-            <a:spLocks noGrp="1"/>
-          </p:cNvSpPr>
-          <p:nvPr>
-            <p:ph sz="half" idx="1"/>
-          </p:nvPr>
-        </p:nvSpPr>
-        <p:spPr>
-          <a:xfrm>
-            <a:off x="458696" y="1351660"/>
-            <a:ext cx="5561106" cy="5225410"/>
-          </a:xfrm>
-        </p:spPr>
-        <p:txBody>
-          <a:bodyPr>
-            <a:normAutofit fontScale="77500" lnSpcReduction="20000"/>
-          </a:bodyPr>
-          <a:lstStyle/>
-          <a:p>
-            <a:pPr marL="0" indent="0">
-              <a:buNone/>
-            </a:pPr>
-            <a:r>
-              <a:rPr lang="en-US" b="1" dirty="0"/>
-              <a:t>What we learned today?</a:t>
-            </a:r>
-          </a:p>
-          <a:p>
-            <a:r>
-              <a:rPr lang="en-US" dirty="0"/>
-              <a:t>Linear regression helps us identify relationship and patterns between </a:t>
-            </a:r>
-            <a:r>
-              <a:rPr lang="en-US" i="1" dirty="0"/>
-              <a:t>independent </a:t>
-            </a:r>
-            <a:r>
-              <a:rPr lang="en-US" dirty="0"/>
-              <a:t>and </a:t>
-            </a:r>
-            <a:r>
-              <a:rPr lang="en-US" i="1" dirty="0"/>
-              <a:t>dependent</a:t>
-            </a:r>
-            <a:r>
-              <a:rPr lang="en-US" dirty="0"/>
-              <a:t> variables</a:t>
-            </a:r>
-          </a:p>
-          <a:p>
-            <a:r>
-              <a:rPr lang="en-US" dirty="0"/>
-              <a:t>Smoking and BMI have high impact!</a:t>
-            </a:r>
-          </a:p>
-          <a:p>
-            <a:r>
-              <a:rPr lang="en-US" dirty="0"/>
-              <a:t>Model coefficients tell us the impact of an individual variable</a:t>
-            </a:r>
-          </a:p>
-          <a:p>
-            <a:r>
-              <a:rPr lang="en-US" dirty="0" err="1"/>
-              <a:t>RSquared</a:t>
-            </a:r>
-            <a:r>
-              <a:rPr lang="en-US" dirty="0"/>
-              <a:t> tells us “goodness of fit” of a model</a:t>
-            </a:r>
-          </a:p>
-          <a:p>
-            <a:r>
-              <a:rPr lang="en-US" dirty="0"/>
-              <a:t>Assumptions of LR should be verified before interpretation</a:t>
-            </a:r>
-          </a:p>
-          <a:p>
-            <a:r>
-              <a:rPr lang="en-US" dirty="0"/>
-              <a:t>Residuals analysis can tell us more about the data than we think</a:t>
-            </a:r>
-          </a:p>
-        </p:txBody>
-      </p:sp>
-      <p:sp>
-        <p:nvSpPr>
-          <p:cNvPr id="4" name="Content Placeholder 3">
-            <a:extLst>
-              <a:ext uri="{FF2B5EF4-FFF2-40B4-BE49-F238E27FC236}">
-                <a16:creationId xmlns:a16="http://schemas.microsoft.com/office/drawing/2014/main" id="{9DC30BDF-2AB0-095A-AEE6-0A7D1C72203C}"/>
-              </a:ext>
-            </a:extLst>
-          </p:cNvPr>
-          <p:cNvSpPr>
-            <a:spLocks noGrp="1"/>
-          </p:cNvSpPr>
-          <p:nvPr>
-            <p:ph sz="half" idx="2"/>
-          </p:nvPr>
-        </p:nvSpPr>
-        <p:spPr>
-          <a:xfrm>
-            <a:off x="6172199" y="1403569"/>
-            <a:ext cx="5561105" cy="4351338"/>
-          </a:xfrm>
-        </p:spPr>
-        <p:txBody>
-          <a:bodyPr>
-            <a:normAutofit fontScale="77500" lnSpcReduction="20000"/>
-          </a:bodyPr>
-          <a:lstStyle/>
-          <a:p>
-            <a:pPr marL="0" indent="0">
-              <a:buNone/>
-            </a:pPr>
-            <a:r>
-              <a:rPr lang="en-US" b="1" dirty="0"/>
-              <a:t>What to remember?</a:t>
-            </a:r>
-          </a:p>
-          <a:p>
-            <a:r>
-              <a:rPr lang="en-US" dirty="0"/>
-              <a:t>Regression’s strength is interpretability</a:t>
-            </a:r>
-          </a:p>
-          <a:p>
-            <a:r>
-              <a:rPr lang="en-US" dirty="0"/>
-              <a:t>Regression coefficient being significant doesn’t imply causality</a:t>
-            </a:r>
-          </a:p>
-          <a:p>
-            <a:r>
-              <a:rPr lang="en-US" dirty="0"/>
-              <a:t>Assumption of “linear model” might be too simplistic for pure prediction</a:t>
-            </a:r>
-          </a:p>
-          <a:p>
-            <a:r>
-              <a:rPr lang="en-US" b="1" dirty="0"/>
-              <a:t>LINE Assumptions: </a:t>
-            </a:r>
-            <a:r>
-              <a:rPr lang="en-US" dirty="0"/>
-              <a:t>Linearity, Independence, Normality, Equal Variance</a:t>
-            </a:r>
-          </a:p>
-          <a:p>
-            <a:r>
-              <a:rPr lang="en-US" b="1" dirty="0"/>
-              <a:t>There is more to regression! We will cover additional topics in coming classes</a:t>
-            </a:r>
-          </a:p>
-        </p:txBody>
-      </p:sp>
-    </p:spTree>
-    <p:extLst>
-      <p:ext uri="{BB962C8B-B14F-4D97-AF65-F5344CB8AC3E}">
-        <p14:creationId xmlns:p14="http://schemas.microsoft.com/office/powerpoint/2010/main" val="4096181571"/>
       </p:ext>
     </p:extLst>
   </p:cSld>
@@ -11429,6 +11400,235 @@
           <p:cNvPr id="2" name="Title 1">
             <a:extLst>
               <a:ext uri="{FF2B5EF4-FFF2-40B4-BE49-F238E27FC236}">
+                <a16:creationId xmlns:a16="http://schemas.microsoft.com/office/drawing/2014/main" id="{90705B0B-3B33-9B5C-F158-DEAAAEC8C05F}"/>
+              </a:ext>
+            </a:extLst>
+          </p:cNvPr>
+          <p:cNvSpPr>
+            <a:spLocks noGrp="1"/>
+          </p:cNvSpPr>
+          <p:nvPr>
+            <p:ph type="title"/>
+          </p:nvPr>
+        </p:nvSpPr>
+        <p:spPr>
+          <a:xfrm>
+            <a:off x="458695" y="18255"/>
+            <a:ext cx="10895106" cy="1325563"/>
+          </a:xfrm>
+        </p:spPr>
+        <p:txBody>
+          <a:bodyPr/>
+          <a:lstStyle/>
+          <a:p>
+            <a:r>
+              <a:rPr lang="en-US" dirty="0"/>
+              <a:t>Concluding Remarks</a:t>
+            </a:r>
+          </a:p>
+        </p:txBody>
+      </p:sp>
+      <p:sp>
+        <p:nvSpPr>
+          <p:cNvPr id="3" name="Content Placeholder 2">
+            <a:extLst>
+              <a:ext uri="{FF2B5EF4-FFF2-40B4-BE49-F238E27FC236}">
+                <a16:creationId xmlns:a16="http://schemas.microsoft.com/office/drawing/2014/main" id="{9CE956AE-7039-39B6-F94E-3EC7FE476B45}"/>
+              </a:ext>
+            </a:extLst>
+          </p:cNvPr>
+          <p:cNvSpPr>
+            <a:spLocks noGrp="1"/>
+          </p:cNvSpPr>
+          <p:nvPr>
+            <p:ph sz="half" idx="1"/>
+          </p:nvPr>
+        </p:nvSpPr>
+        <p:spPr>
+          <a:xfrm>
+            <a:off x="458696" y="1351660"/>
+            <a:ext cx="5561106" cy="5225410"/>
+          </a:xfrm>
+        </p:spPr>
+        <p:txBody>
+          <a:bodyPr>
+            <a:normAutofit fontScale="77500" lnSpcReduction="20000"/>
+          </a:bodyPr>
+          <a:lstStyle/>
+          <a:p>
+            <a:pPr marL="0" indent="0">
+              <a:buNone/>
+            </a:pPr>
+            <a:r>
+              <a:rPr lang="en-US" b="1" dirty="0"/>
+              <a:t>What we learned today?</a:t>
+            </a:r>
+          </a:p>
+          <a:p>
+            <a:r>
+              <a:rPr lang="en-US" dirty="0"/>
+              <a:t>Linear regression helps us identify relationship and patterns between </a:t>
+            </a:r>
+            <a:r>
+              <a:rPr lang="en-US" i="1" dirty="0"/>
+              <a:t>independent </a:t>
+            </a:r>
+            <a:r>
+              <a:rPr lang="en-US" dirty="0"/>
+              <a:t>and </a:t>
+            </a:r>
+            <a:r>
+              <a:rPr lang="en-US" i="1" dirty="0"/>
+              <a:t>dependent</a:t>
+            </a:r>
+            <a:r>
+              <a:rPr lang="en-US" dirty="0"/>
+              <a:t> variables</a:t>
+            </a:r>
+          </a:p>
+          <a:p>
+            <a:r>
+              <a:rPr lang="en-US" dirty="0"/>
+              <a:t>Smoking and BMI have high impact!</a:t>
+            </a:r>
+          </a:p>
+          <a:p>
+            <a:r>
+              <a:rPr lang="en-US" dirty="0"/>
+              <a:t>Model coefficients tell us the impact of an individual variable</a:t>
+            </a:r>
+          </a:p>
+          <a:p>
+            <a:r>
+              <a:rPr lang="en-US" dirty="0" err="1"/>
+              <a:t>RSquared</a:t>
+            </a:r>
+            <a:r>
+              <a:rPr lang="en-US" dirty="0"/>
+              <a:t> tells us “goodness of fit” of a model</a:t>
+            </a:r>
+          </a:p>
+          <a:p>
+            <a:r>
+              <a:rPr lang="en-US" dirty="0"/>
+              <a:t>Assumptions of LR should be verified before interpretation</a:t>
+            </a:r>
+          </a:p>
+          <a:p>
+            <a:r>
+              <a:rPr lang="en-US" dirty="0"/>
+              <a:t>Residuals analysis can tell us more about the data than we think</a:t>
+            </a:r>
+          </a:p>
+        </p:txBody>
+      </p:sp>
+      <p:sp>
+        <p:nvSpPr>
+          <p:cNvPr id="4" name="Content Placeholder 3">
+            <a:extLst>
+              <a:ext uri="{FF2B5EF4-FFF2-40B4-BE49-F238E27FC236}">
+                <a16:creationId xmlns:a16="http://schemas.microsoft.com/office/drawing/2014/main" id="{9DC30BDF-2AB0-095A-AEE6-0A7D1C72203C}"/>
+              </a:ext>
+            </a:extLst>
+          </p:cNvPr>
+          <p:cNvSpPr>
+            <a:spLocks noGrp="1"/>
+          </p:cNvSpPr>
+          <p:nvPr>
+            <p:ph sz="half" idx="2"/>
+          </p:nvPr>
+        </p:nvSpPr>
+        <p:spPr>
+          <a:xfrm>
+            <a:off x="6172199" y="1403569"/>
+            <a:ext cx="5561105" cy="4351338"/>
+          </a:xfrm>
+        </p:spPr>
+        <p:txBody>
+          <a:bodyPr>
+            <a:normAutofit fontScale="77500" lnSpcReduction="20000"/>
+          </a:bodyPr>
+          <a:lstStyle/>
+          <a:p>
+            <a:pPr marL="0" indent="0">
+              <a:buNone/>
+            </a:pPr>
+            <a:r>
+              <a:rPr lang="en-US" b="1" dirty="0"/>
+              <a:t>What to remember?</a:t>
+            </a:r>
+          </a:p>
+          <a:p>
+            <a:r>
+              <a:rPr lang="en-US" dirty="0"/>
+              <a:t>Regression’s strength is interpretability</a:t>
+            </a:r>
+          </a:p>
+          <a:p>
+            <a:r>
+              <a:rPr lang="en-US" dirty="0"/>
+              <a:t>Regression coefficient being significant doesn’t imply causality</a:t>
+            </a:r>
+          </a:p>
+          <a:p>
+            <a:r>
+              <a:rPr lang="en-US" dirty="0"/>
+              <a:t>Assumption of “linear model” might be too simplistic for pure prediction</a:t>
+            </a:r>
+          </a:p>
+          <a:p>
+            <a:r>
+              <a:rPr lang="en-US" b="1" dirty="0"/>
+              <a:t>LINE Assumptions: </a:t>
+            </a:r>
+            <a:r>
+              <a:rPr lang="en-US" dirty="0"/>
+              <a:t>Linearity, Independence, Normality, Equal Variance</a:t>
+            </a:r>
+          </a:p>
+          <a:p>
+            <a:r>
+              <a:rPr lang="en-US" b="1" dirty="0"/>
+              <a:t>There is more to regression! We will cover additional topics in coming classes</a:t>
+            </a:r>
+          </a:p>
+        </p:txBody>
+      </p:sp>
+    </p:spTree>
+    <p:extLst>
+      <p:ext uri="{BB962C8B-B14F-4D97-AF65-F5344CB8AC3E}">
+        <p14:creationId xmlns:p14="http://schemas.microsoft.com/office/powerpoint/2010/main" val="4096181571"/>
+      </p:ext>
+    </p:extLst>
+  </p:cSld>
+  <p:clrMapOvr>
+    <a:masterClrMapping/>
+  </p:clrMapOvr>
+</p:sld>
+</file>
+
+<file path=ppt/slides/slide31.xml><?xml version="1.0" encoding="utf-8"?>
+<p:sld xmlns:a="http://schemas.openxmlformats.org/drawingml/2006/main" xmlns:r="http://schemas.openxmlformats.org/officeDocument/2006/relationships" xmlns:p="http://schemas.openxmlformats.org/presentationml/2006/main">
+  <p:cSld>
+    <p:spTree>
+      <p:nvGrpSpPr>
+        <p:cNvPr id="1" name=""/>
+        <p:cNvGrpSpPr/>
+        <p:nvPr/>
+      </p:nvGrpSpPr>
+      <p:grpSpPr>
+        <a:xfrm>
+          <a:off x="0" y="0"/>
+          <a:ext cx="0" cy="0"/>
+          <a:chOff x="0" y="0"/>
+          <a:chExt cx="0" cy="0"/>
+        </a:xfrm>
+      </p:grpSpPr>
+      <p:sp>
+        <p:nvSpPr>
+          <p:cNvPr id="2" name="Title 1">
+            <a:extLst>
+              <a:ext uri="{FF2B5EF4-FFF2-40B4-BE49-F238E27FC236}">
                 <a16:creationId xmlns:a16="http://schemas.microsoft.com/office/drawing/2014/main" id="{0EACD1D4-65E0-5B6C-5AF0-7D9E309F8B3B}"/>
               </a:ext>
             </a:extLst>
@@ -11560,7 +11760,7 @@
 </p:sld>
 </file>
 
-<file path=ppt/slides/slide31.xml><?xml version="1.0" encoding="utf-8"?>
+<file path=ppt/slides/slide32.xml><?xml version="1.0" encoding="utf-8"?>
 <p:sld xmlns:a="http://schemas.openxmlformats.org/drawingml/2006/main" xmlns:r="http://schemas.openxmlformats.org/officeDocument/2006/relationships" xmlns:p="http://schemas.openxmlformats.org/presentationml/2006/main">
   <p:cSld>
     <p:bg>
@@ -12180,6 +12380,120 @@
 </file>
 
 <file path=ppt/slides/slide5.xml><?xml version="1.0" encoding="utf-8"?>
+<p:sld xmlns:a="http://schemas.openxmlformats.org/drawingml/2006/main" xmlns:r="http://schemas.openxmlformats.org/officeDocument/2006/relationships" xmlns:p="http://schemas.openxmlformats.org/presentationml/2006/main">
+  <p:cSld>
+    <p:spTree>
+      <p:nvGrpSpPr>
+        <p:cNvPr id="1" name=""/>
+        <p:cNvGrpSpPr/>
+        <p:nvPr/>
+      </p:nvGrpSpPr>
+      <p:grpSpPr>
+        <a:xfrm>
+          <a:off x="0" y="0"/>
+          <a:ext cx="0" cy="0"/>
+          <a:chOff x="0" y="0"/>
+          <a:chExt cx="0" cy="0"/>
+        </a:xfrm>
+      </p:grpSpPr>
+      <p:pic>
+        <p:nvPicPr>
+          <p:cNvPr id="1026" name="Picture 2" descr="Image">
+            <a:extLst>
+              <a:ext uri="{FF2B5EF4-FFF2-40B4-BE49-F238E27FC236}">
+                <a16:creationId xmlns:a16="http://schemas.microsoft.com/office/drawing/2014/main" id="{E7FBBC34-ABF0-5A7B-6545-63FEAD7FBC2A}"/>
+              </a:ext>
+            </a:extLst>
+          </p:cNvPr>
+          <p:cNvPicPr>
+            <a:picLocks noGrp="1" noChangeAspect="1" noChangeArrowheads="1"/>
+          </p:cNvPicPr>
+          <p:nvPr>
+            <p:ph idx="1"/>
+          </p:nvPr>
+        </p:nvPicPr>
+        <p:blipFill>
+          <a:blip r:embed="rId2">
+            <a:extLst>
+              <a:ext uri="{28A0092B-C50C-407E-A947-70E740481C1C}">
+                <a14:useLocalDpi xmlns:a14="http://schemas.microsoft.com/office/drawing/2010/main" val="0"/>
+              </a:ext>
+            </a:extLst>
+          </a:blip>
+          <a:srcRect/>
+          <a:stretch>
+            <a:fillRect/>
+          </a:stretch>
+        </p:blipFill>
+        <p:spPr bwMode="auto">
+          <a:xfrm>
+            <a:off x="702108" y="663371"/>
+            <a:ext cx="10787783" cy="5531257"/>
+          </a:xfrm>
+          <a:prstGeom prst="rect">
+            <a:avLst/>
+          </a:prstGeom>
+          <a:noFill/>
+          <a:extLst>
+            <a:ext uri="{909E8E84-426E-40DD-AFC4-6F175D3DCCD1}">
+              <a14:hiddenFill xmlns:a14="http://schemas.microsoft.com/office/drawing/2010/main">
+                <a:solidFill>
+                  <a:srgbClr val="FFFFFF"/>
+                </a:solidFill>
+              </a14:hiddenFill>
+            </a:ext>
+          </a:extLst>
+        </p:spPr>
+      </p:pic>
+      <p:sp>
+        <p:nvSpPr>
+          <p:cNvPr id="4" name="TextBox 3">
+            <a:extLst>
+              <a:ext uri="{FF2B5EF4-FFF2-40B4-BE49-F238E27FC236}">
+                <a16:creationId xmlns:a16="http://schemas.microsoft.com/office/drawing/2014/main" id="{1A9A287E-EBA8-8534-85C4-9539912B8DA7}"/>
+              </a:ext>
+            </a:extLst>
+          </p:cNvPr>
+          <p:cNvSpPr txBox="1"/>
+          <p:nvPr/>
+        </p:nvSpPr>
+        <p:spPr>
+          <a:xfrm>
+            <a:off x="10348332" y="6488668"/>
+            <a:ext cx="1669368" cy="369332"/>
+          </a:xfrm>
+          <a:prstGeom prst="rect">
+            <a:avLst/>
+          </a:prstGeom>
+          <a:noFill/>
+        </p:spPr>
+        <p:txBody>
+          <a:bodyPr wrap="none" rtlCol="0">
+            <a:spAutoFit/>
+          </a:bodyPr>
+          <a:lstStyle/>
+          <a:p>
+            <a:r>
+              <a:rPr lang="en-US" dirty="0"/>
+              <a:t>Source: XKCD</a:t>
+            </a:r>
+          </a:p>
+        </p:txBody>
+      </p:sp>
+    </p:spTree>
+    <p:extLst>
+      <p:ext uri="{BB962C8B-B14F-4D97-AF65-F5344CB8AC3E}">
+        <p14:creationId xmlns:p14="http://schemas.microsoft.com/office/powerpoint/2010/main" val="2574720109"/>
+      </p:ext>
+    </p:extLst>
+  </p:cSld>
+  <p:clrMapOvr>
+    <a:masterClrMapping/>
+  </p:clrMapOvr>
+</p:sld>
+</file>
+
+<file path=ppt/slides/slide6.xml><?xml version="1.0" encoding="utf-8"?>
 <p:sld xmlns:a="http://schemas.openxmlformats.org/drawingml/2006/main" xmlns:r="http://schemas.openxmlformats.org/officeDocument/2006/relationships" xmlns:p="http://schemas.openxmlformats.org/presentationml/2006/main">
   <p:cSld>
     <p:spTree>
@@ -12634,7 +12948,7 @@
 </p:sld>
 </file>
 
-<file path=ppt/slides/slide6.xml><?xml version="1.0" encoding="utf-8"?>
+<file path=ppt/slides/slide7.xml><?xml version="1.0" encoding="utf-8"?>
 <p:sld xmlns:a="http://schemas.openxmlformats.org/drawingml/2006/main" xmlns:r="http://schemas.openxmlformats.org/officeDocument/2006/relationships" xmlns:p="http://schemas.openxmlformats.org/presentationml/2006/main">
   <p:cSld>
     <p:spTree>
@@ -12785,7 +13099,7 @@
 </p:sld>
 </file>
 
-<file path=ppt/slides/slide7.xml><?xml version="1.0" encoding="utf-8"?>
+<file path=ppt/slides/slide8.xml><?xml version="1.0" encoding="utf-8"?>
 <p:sld xmlns:a="http://schemas.openxmlformats.org/drawingml/2006/main" xmlns:r="http://schemas.openxmlformats.org/officeDocument/2006/relationships" xmlns:p="http://schemas.openxmlformats.org/presentationml/2006/main">
   <p:cSld>
     <p:bg>
@@ -13372,7 +13686,7 @@
 </p:sld>
 </file>
 
-<file path=ppt/slides/slide8.xml><?xml version="1.0" encoding="utf-8"?>
+<file path=ppt/slides/slide9.xml><?xml version="1.0" encoding="utf-8"?>
 <p:sld xmlns:a="http://schemas.openxmlformats.org/drawingml/2006/main" xmlns:r="http://schemas.openxmlformats.org/officeDocument/2006/relationships" xmlns:p="http://schemas.openxmlformats.org/presentationml/2006/main">
   <p:cSld>
     <p:spTree>
@@ -13710,205 +14024,6 @@
     <p:extLst>
       <p:ext uri="{BB962C8B-B14F-4D97-AF65-F5344CB8AC3E}">
         <p14:creationId xmlns:p14="http://schemas.microsoft.com/office/powerpoint/2010/main" val="2657178138"/>
-      </p:ext>
-    </p:extLst>
-  </p:cSld>
-  <p:clrMapOvr>
-    <a:masterClrMapping/>
-  </p:clrMapOvr>
-</p:sld>
-</file>
-
-<file path=ppt/slides/slide9.xml><?xml version="1.0" encoding="utf-8"?>
-<p:sld xmlns:a="http://schemas.openxmlformats.org/drawingml/2006/main" xmlns:r="http://schemas.openxmlformats.org/officeDocument/2006/relationships" xmlns:p="http://schemas.openxmlformats.org/presentationml/2006/main">
-  <p:cSld>
-    <p:spTree>
-      <p:nvGrpSpPr>
-        <p:cNvPr id="1" name=""/>
-        <p:cNvGrpSpPr/>
-        <p:nvPr/>
-      </p:nvGrpSpPr>
-      <p:grpSpPr>
-        <a:xfrm>
-          <a:off x="0" y="0"/>
-          <a:ext cx="0" cy="0"/>
-          <a:chOff x="0" y="0"/>
-          <a:chExt cx="0" cy="0"/>
-        </a:xfrm>
-      </p:grpSpPr>
-      <p:sp>
-        <p:nvSpPr>
-          <p:cNvPr id="2" name="Title 1">
-            <a:extLst>
-              <a:ext uri="{FF2B5EF4-FFF2-40B4-BE49-F238E27FC236}">
-                <a16:creationId xmlns:a16="http://schemas.microsoft.com/office/drawing/2014/main" id="{5310DE1A-4192-5553-29B5-6BA6656017A3}"/>
-              </a:ext>
-            </a:extLst>
-          </p:cNvPr>
-          <p:cNvSpPr>
-            <a:spLocks noGrp="1"/>
-          </p:cNvSpPr>
-          <p:nvPr>
-            <p:ph type="title"/>
-          </p:nvPr>
-        </p:nvSpPr>
-        <p:spPr/>
-        <p:txBody>
-          <a:bodyPr/>
-          <a:lstStyle/>
-          <a:p>
-            <a:r>
-              <a:rPr lang="en-US" dirty="0"/>
-              <a:t>Massachusetts Department of Public Health (MDPH)</a:t>
-            </a:r>
-          </a:p>
-        </p:txBody>
-      </p:sp>
-      <p:sp>
-        <p:nvSpPr>
-          <p:cNvPr id="3" name="Content Placeholder 2">
-            <a:extLst>
-              <a:ext uri="{FF2B5EF4-FFF2-40B4-BE49-F238E27FC236}">
-                <a16:creationId xmlns:a16="http://schemas.microsoft.com/office/drawing/2014/main" id="{5EC2C4E6-C8FD-D740-3ACD-1622C342669E}"/>
-              </a:ext>
-            </a:extLst>
-          </p:cNvPr>
-          <p:cNvSpPr>
-            <a:spLocks noGrp="1"/>
-          </p:cNvSpPr>
-          <p:nvPr>
-            <p:ph idx="1"/>
-          </p:nvPr>
-        </p:nvSpPr>
-        <p:spPr/>
-        <p:txBody>
-          <a:bodyPr>
-            <a:normAutofit fontScale="92500" lnSpcReduction="10000"/>
-          </a:bodyPr>
-          <a:lstStyle/>
-          <a:p>
-            <a:r>
-              <a:rPr lang="en-US" dirty="0"/>
-              <a:t>Goals</a:t>
-            </a:r>
-          </a:p>
-          <a:p>
-            <a:pPr marL="971550" lvl="1" indent="-514350">
-              <a:buFont typeface="+mj-lt"/>
-              <a:buAutoNum type="arabicPeriod"/>
-            </a:pPr>
-            <a:r>
-              <a:rPr lang="en-US" dirty="0"/>
-              <a:t>Identify actionable Policy Insights for MDPH</a:t>
-            </a:r>
-          </a:p>
-          <a:p>
-            <a:pPr marL="971550" lvl="1" indent="-514350">
-              <a:buFont typeface="+mj-lt"/>
-              <a:buAutoNum type="arabicPeriod"/>
-            </a:pPr>
-            <a:r>
-              <a:rPr lang="en-US" dirty="0"/>
-              <a:t>Empower insurers to structure premiums based on evidence rather than assumptions</a:t>
-            </a:r>
-          </a:p>
-          <a:p>
-            <a:r>
-              <a:rPr lang="en-US" dirty="0"/>
-              <a:t>Variables</a:t>
-            </a:r>
-          </a:p>
-          <a:p>
-            <a:pPr marL="971550" lvl="1" indent="-514350">
-              <a:buFont typeface="+mj-lt"/>
-              <a:buAutoNum type="arabicPeriod"/>
-            </a:pPr>
-            <a:r>
-              <a:rPr lang="en-US" dirty="0"/>
-              <a:t>Sex, Smoking Habits, Region </a:t>
-            </a:r>
-          </a:p>
-          <a:p>
-            <a:pPr marL="971550" lvl="1" indent="-514350">
-              <a:buFont typeface="+mj-lt"/>
-              <a:buAutoNum type="arabicPeriod"/>
-            </a:pPr>
-            <a:r>
-              <a:rPr lang="en-US" dirty="0"/>
-              <a:t>Age, BMI, Dependents</a:t>
-            </a:r>
-          </a:p>
-          <a:p>
-            <a:pPr marL="971550" lvl="1" indent="-514350">
-              <a:buFont typeface="+mj-lt"/>
-              <a:buAutoNum type="arabicPeriod"/>
-            </a:pPr>
-            <a:r>
-              <a:rPr lang="en-US" dirty="0"/>
-              <a:t>Insurance Charges</a:t>
-            </a:r>
-          </a:p>
-        </p:txBody>
-      </p:sp>
-      <p:sp>
-        <p:nvSpPr>
-          <p:cNvPr id="4" name="Text Placeholder 3">
-            <a:extLst>
-              <a:ext uri="{FF2B5EF4-FFF2-40B4-BE49-F238E27FC236}">
-                <a16:creationId xmlns:a16="http://schemas.microsoft.com/office/drawing/2014/main" id="{434C140E-6C65-A811-E965-00A3ABEE9232}"/>
-              </a:ext>
-            </a:extLst>
-          </p:cNvPr>
-          <p:cNvSpPr>
-            <a:spLocks noGrp="1"/>
-          </p:cNvSpPr>
-          <p:nvPr>
-            <p:ph type="body" sz="half" idx="2"/>
-          </p:nvPr>
-        </p:nvSpPr>
-        <p:spPr/>
-        <p:txBody>
-          <a:bodyPr/>
-          <a:lstStyle/>
-          <a:p>
-            <a:r>
-              <a:rPr lang="en-US" dirty="0"/>
-              <a:t>Identifying key factors driving health insurance charges.</a:t>
-            </a:r>
-          </a:p>
-          <a:p>
-            <a:endParaRPr lang="en-US" dirty="0"/>
-          </a:p>
-          <a:p>
-            <a:endParaRPr lang="en-US" b="1" dirty="0"/>
-          </a:p>
-          <a:p>
-            <a:endParaRPr lang="en-US" b="1" dirty="0"/>
-          </a:p>
-          <a:p>
-            <a:endParaRPr lang="en-US" b="1" dirty="0"/>
-          </a:p>
-          <a:p>
-            <a:endParaRPr lang="en-US" b="1" dirty="0"/>
-          </a:p>
-          <a:p>
-            <a:endParaRPr lang="en-US" b="1" dirty="0"/>
-          </a:p>
-          <a:p>
-            <a:endParaRPr lang="en-US" b="1" dirty="0"/>
-          </a:p>
-          <a:p>
-            <a:r>
-              <a:rPr lang="en-US" b="1" dirty="0"/>
-              <a:t>NOTE: Fictional Case Study</a:t>
-            </a:r>
-          </a:p>
-        </p:txBody>
-      </p:sp>
-    </p:spTree>
-    <p:extLst>
-      <p:ext uri="{BB962C8B-B14F-4D97-AF65-F5344CB8AC3E}">
-        <p14:creationId xmlns:p14="http://schemas.microsoft.com/office/powerpoint/2010/main" val="2681427100"/>
       </p:ext>
     </p:extLst>
   </p:cSld>

</xml_diff>